<commit_message>
Adding links to articles on const and let
</commit_message>
<xml_diff>
--- a/unit_00/html_review/04 JavaScript.pptx
+++ b/unit_00/html_review/04 JavaScript.pptx
@@ -253,7 +253,7 @@
           <a:p>
             <a:fld id="{3F839238-B565-4611-A910-43B731DECEC1}" type="datetimeFigureOut">
               <a:rPr lang="en-US" smtClean="0"/>
-              <a:t>8/10/2020</a:t>
+              <a:t>8/14/2020</a:t>
             </a:fld>
             <a:endParaRPr lang="en-US" dirty="0"/>
           </a:p>
@@ -2794,7 +2794,7 @@
           <a:p>
             <a:fld id="{E9F25E47-8026-47FD-8FD6-2C7B55A6BE4F}" type="datetime1">
               <a:rPr lang="en-US" smtClean="0"/>
-              <a:t>8/10/2020</a:t>
+              <a:t>8/14/2020</a:t>
             </a:fld>
             <a:endParaRPr lang="en-US" dirty="0"/>
           </a:p>
@@ -2996,7 +2996,7 @@
           <a:p>
             <a:fld id="{49F0A7AA-AB30-4D36-B646-A02FA5DCCA55}" type="datetime1">
               <a:rPr lang="en-US" smtClean="0"/>
-              <a:t>8/10/2020</a:t>
+              <a:t>8/14/2020</a:t>
             </a:fld>
             <a:endParaRPr lang="en-US" dirty="0"/>
           </a:p>
@@ -3595,7 +3595,7 @@
           <a:p>
             <a:fld id="{CFA4D178-B71E-4B10-AF0F-C5E0B7294A7C}" type="datetime1">
               <a:rPr lang="en-US" smtClean="0"/>
-              <a:t>8/10/2020</a:t>
+              <a:t>8/14/2020</a:t>
             </a:fld>
             <a:endParaRPr lang="en-US" dirty="0"/>
           </a:p>
@@ -3915,7 +3915,7 @@
           <a:p>
             <a:fld id="{27E6D853-85C2-4120-A6B2-2EAC4467BF8B}" type="datetime1">
               <a:rPr lang="en-US" smtClean="0"/>
-              <a:t>8/10/2020</a:t>
+              <a:t>8/14/2020</a:t>
             </a:fld>
             <a:endParaRPr lang="en-US" dirty="0"/>
           </a:p>
@@ -4352,7 +4352,7 @@
           <a:p>
             <a:fld id="{CA3AECF5-4644-4878-B4B4-3AC946C4B252}" type="datetime1">
               <a:rPr lang="en-US" smtClean="0"/>
-              <a:t>8/10/2020</a:t>
+              <a:t>8/14/2020</a:t>
             </a:fld>
             <a:endParaRPr lang="en-US" dirty="0"/>
           </a:p>
@@ -4470,7 +4470,7 @@
           <a:p>
             <a:fld id="{B8E389F8-4EAE-4B22-8731-40270585493B}" type="datetime1">
               <a:rPr lang="en-US" smtClean="0"/>
-              <a:t>8/10/2020</a:t>
+              <a:t>8/14/2020</a:t>
             </a:fld>
             <a:endParaRPr lang="en-US" dirty="0"/>
           </a:p>
@@ -4565,7 +4565,7 @@
           <a:p>
             <a:fld id="{772F4F3F-699B-4D10-AAB9-00C2579C25F8}" type="datetime1">
               <a:rPr lang="en-US" smtClean="0"/>
-              <a:t>8/10/2020</a:t>
+              <a:t>8/14/2020</a:t>
             </a:fld>
             <a:endParaRPr lang="en-US" dirty="0"/>
           </a:p>
@@ -4982,7 +4982,7 @@
           <a:p>
             <a:fld id="{E51BA90F-EE6C-42F5-8961-2F52EE18037D}" type="datetime1">
               <a:rPr lang="en-US" smtClean="0"/>
-              <a:t>8/10/2020</a:t>
+              <a:t>8/14/2020</a:t>
             </a:fld>
             <a:endParaRPr lang="en-US" dirty="0"/>
           </a:p>
@@ -5242,7 +5242,7 @@
           <a:p>
             <a:fld id="{FB6292F5-AD2B-47F4-B460-BF55BF34C27D}" type="datetime1">
               <a:rPr lang="en-US" smtClean="0"/>
-              <a:t>8/10/2020</a:t>
+              <a:t>8/14/2020</a:t>
             </a:fld>
             <a:endParaRPr lang="en-US" dirty="0"/>
           </a:p>
@@ -5758,7 +5758,7 @@
           <a:p>
             <a:fld id="{8B88B800-945A-43B0-8EA5-8657D67FD7E1}" type="datetime1">
               <a:rPr lang="en-US" smtClean="0"/>
-              <a:t>8/10/2020</a:t>
+              <a:t>8/14/2020</a:t>
             </a:fld>
             <a:endParaRPr lang="en-US" dirty="0"/>
           </a:p>
@@ -6490,7 +6490,12 @@
             <p:ph type="title"/>
           </p:nvPr>
         </p:nvSpPr>
-        <p:spPr/>
+        <p:spPr>
+          <a:xfrm>
+            <a:off x="1066800" y="177800"/>
+            <a:ext cx="10058400" cy="1371600"/>
+          </a:xfrm>
+        </p:spPr>
         <p:txBody>
           <a:bodyPr>
             <a:normAutofit/>
@@ -6543,13 +6548,13 @@
           <p:nvPr>
             <p:extLst>
               <p:ext uri="{D42A27DB-BD31-4B8C-83A1-F6EECF244321}">
-                <p14:modId xmlns:p14="http://schemas.microsoft.com/office/powerpoint/2010/main" val="2912670328"/>
+                <p14:modId xmlns:p14="http://schemas.microsoft.com/office/powerpoint/2010/main" val="3837735145"/>
               </p:ext>
             </p:extLst>
           </p:nvPr>
         </p:nvGraphicFramePr>
         <p:xfrm>
-          <a:off x="1066800" y="1915160"/>
+          <a:off x="1066800" y="1549400"/>
           <a:ext cx="9980168" cy="4119880"/>
         </p:xfrm>
         <a:graphic>
@@ -7150,6 +7155,79 @@
           </a:graphicData>
         </a:graphic>
       </p:graphicFrame>
+      <p:sp>
+        <p:nvSpPr>
+          <p:cNvPr id="4" name="TextBox 3">
+            <a:extLst>
+              <a:ext uri="{FF2B5EF4-FFF2-40B4-BE49-F238E27FC236}">
+                <a16:creationId xmlns:a16="http://schemas.microsoft.com/office/drawing/2014/main" id="{EC968143-EC4B-46D9-A039-B55E891D9B70}"/>
+              </a:ext>
+            </a:extLst>
+          </p:cNvPr>
+          <p:cNvSpPr txBox="1"/>
+          <p:nvPr/>
+        </p:nvSpPr>
+        <p:spPr>
+          <a:xfrm>
+            <a:off x="988568" y="5754469"/>
+            <a:ext cx="10058400" cy="646331"/>
+          </a:xfrm>
+          <a:prstGeom prst="rect">
+            <a:avLst/>
+          </a:prstGeom>
+          <a:noFill/>
+        </p:spPr>
+        <p:txBody>
+          <a:bodyPr wrap="square" rtlCol="0">
+            <a:spAutoFit/>
+          </a:bodyPr>
+          <a:lstStyle/>
+          <a:p>
+            <a:r>
+              <a:rPr lang="en-US" b="1">
+                <a:solidFill>
+                  <a:srgbClr val="00B0F0"/>
+                </a:solidFill>
+                <a:hlinkClick r:id="rId2">
+                  <a:extLst>
+                    <a:ext uri="{A12FA001-AC4F-418D-AE19-62706E023703}">
+                      <ahyp:hlinkClr xmlns:ahyp="http://schemas.microsoft.com/office/drawing/2018/hyperlinkcolor" val="tx"/>
+                    </a:ext>
+                  </a:extLst>
+                </a:hlinkClick>
+              </a:rPr>
+              <a:t>Article: Why you shouldn't use var anymore</a:t>
+            </a:r>
+            <a:endParaRPr lang="en-US" b="1">
+              <a:solidFill>
+                <a:srgbClr val="00B0F0"/>
+              </a:solidFill>
+            </a:endParaRPr>
+          </a:p>
+          <a:p>
+            <a:r>
+              <a:rPr lang="en-US" b="1">
+                <a:solidFill>
+                  <a:srgbClr val="00B0F0"/>
+                </a:solidFill>
+                <a:hlinkClick r:id="rId3">
+                  <a:extLst>
+                    <a:ext uri="{A12FA001-AC4F-418D-AE19-62706E023703}">
+                      <ahyp:hlinkClr xmlns:ahyp="http://schemas.microsoft.com/office/drawing/2018/hyperlinkcolor" val="tx"/>
+                    </a:ext>
+                  </a:extLst>
+                </a:hlinkClick>
+              </a:rPr>
+              <a:t>Article: var, let, and const - What's the difference?</a:t>
+            </a:r>
+            <a:endParaRPr lang="en-US" b="1">
+              <a:solidFill>
+                <a:srgbClr val="00B0F0"/>
+              </a:solidFill>
+            </a:endParaRPr>
+          </a:p>
+        </p:txBody>
+      </p:sp>
     </p:spTree>
     <p:extLst>
       <p:ext uri="{BB962C8B-B14F-4D97-AF65-F5344CB8AC3E}">
@@ -24316,24 +24394,6 @@
 </file>
 
 <file path=customXml/item1.xml><?xml version="1.0" encoding="utf-8"?>
-<?mso-contentType ?>
-<FormTemplates xmlns="http://schemas.microsoft.com/sharepoint/v3/contenttype/forms">
-  <Display>DocumentLibraryForm</Display>
-  <Edit>DocumentLibraryForm</Edit>
-  <New>DocumentLibraryForm</New>
-</FormTemplates>
-</file>
-
-<file path=customXml/item2.xml><?xml version="1.0" encoding="utf-8"?>
-<p:properties xmlns:p="http://schemas.microsoft.com/office/2006/metadata/properties" xmlns:xsi="http://www.w3.org/2001/XMLSchema-instance" xmlns:pc="http://schemas.microsoft.com/office/infopath/2007/PartnerControls">
-  <documentManagement>
-    <Status xmlns="71af3243-3dd4-4a8d-8c0d-dd76da1f02a5">Not started</Status>
-    <MediaServiceKeyPoints xmlns="71af3243-3dd4-4a8d-8c0d-dd76da1f02a5" xsi:nil="true"/>
-  </documentManagement>
-</p:properties>
-</file>
-
-<file path=customXml/item3.xml><?xml version="1.0" encoding="utf-8"?>
 <ct:contentTypeSchema xmlns:ct="http://schemas.microsoft.com/office/2006/metadata/contentType" xmlns:ma="http://schemas.microsoft.com/office/2006/metadata/properties/metaAttributes" ct:_="" ma:_="" ma:contentTypeName="Document" ma:contentTypeID="0x01010079F111ED35F8CC479449609E8A0923A6" ma:contentTypeVersion="12" ma:contentTypeDescription="Create a new document." ma:contentTypeScope="" ma:versionID="a410dd7f93c95333ffa1b60ed6adedd1">
   <xsd:schema xmlns:xsd="http://www.w3.org/2001/XMLSchema" xmlns:xs="http://www.w3.org/2001/XMLSchema" xmlns:p="http://schemas.microsoft.com/office/2006/metadata/properties" xmlns:ns2="71af3243-3dd4-4a8d-8c0d-dd76da1f02a5" xmlns:ns3="16c05727-aa75-4e4a-9b5f-8a80a1165891" targetNamespace="http://schemas.microsoft.com/office/2006/metadata/properties" ma:root="true" ma:fieldsID="a936d9baba76aa3866493feff160faab" ns2:_="" ns3:_="">
     <xsd:import namespace="71af3243-3dd4-4a8d-8c0d-dd76da1f02a5"/>
@@ -24554,32 +24614,25 @@
 </ct:contentTypeSchema>
 </file>
 
-<file path=customXml/itemProps1.xml><?xml version="1.0" encoding="utf-8"?>
-<ds:datastoreItem xmlns:ds="http://schemas.openxmlformats.org/officeDocument/2006/customXml" ds:itemID="{CDB58277-F8DF-46FF-84EC-EF41B835E69F}">
-  <ds:schemaRefs>
-    <ds:schemaRef ds:uri="http://schemas.microsoft.com/sharepoint/v3/contenttype/forms"/>
-  </ds:schemaRefs>
-</ds:datastoreItem>
+<file path=customXml/item2.xml><?xml version="1.0" encoding="utf-8"?>
+<?mso-contentType ?>
+<FormTemplates xmlns="http://schemas.microsoft.com/sharepoint/v3/contenttype/forms">
+  <Display>DocumentLibraryForm</Display>
+  <Edit>DocumentLibraryForm</Edit>
+  <New>DocumentLibraryForm</New>
+</FormTemplates>
 </file>
 
-<file path=customXml/itemProps2.xml><?xml version="1.0" encoding="utf-8"?>
-<ds:datastoreItem xmlns:ds="http://schemas.openxmlformats.org/officeDocument/2006/customXml" ds:itemID="{137651BA-F45C-4845-9AB3-E0A65B39F5E1}">
-  <ds:schemaRefs>
-    <ds:schemaRef ds:uri="http://schemas.microsoft.com/office/2006/documentManagement/types"/>
-    <ds:schemaRef ds:uri="http://schemas.microsoft.com/office/infopath/2007/PartnerControls"/>
-    <ds:schemaRef ds:uri="http://purl.org/dc/elements/1.1/"/>
-    <ds:schemaRef ds:uri="71af3243-3dd4-4a8d-8c0d-dd76da1f02a5"/>
-    <ds:schemaRef ds:uri="http://schemas.microsoft.com/office/2006/metadata/properties"/>
-    <ds:schemaRef ds:uri="16c05727-aa75-4e4a-9b5f-8a80a1165891"/>
-    <ds:schemaRef ds:uri="http://purl.org/dc/terms/"/>
-    <ds:schemaRef ds:uri="http://schemas.openxmlformats.org/package/2006/metadata/core-properties"/>
-    <ds:schemaRef ds:uri="http://www.w3.org/XML/1998/namespace"/>
-    <ds:schemaRef ds:uri="http://purl.org/dc/dcmitype/"/>
-  </ds:schemaRefs>
-</ds:datastoreItem>
+<file path=customXml/item3.xml><?xml version="1.0" encoding="utf-8"?>
+<p:properties xmlns:p="http://schemas.microsoft.com/office/2006/metadata/properties" xmlns:xsi="http://www.w3.org/2001/XMLSchema-instance" xmlns:pc="http://schemas.microsoft.com/office/infopath/2007/PartnerControls">
+  <documentManagement>
+    <Status xmlns="71af3243-3dd4-4a8d-8c0d-dd76da1f02a5">Not started</Status>
+    <MediaServiceKeyPoints xmlns="71af3243-3dd4-4a8d-8c0d-dd76da1f02a5" xsi:nil="true"/>
+  </documentManagement>
+</p:properties>
 </file>
 
-<file path=customXml/itemProps3.xml><?xml version="1.0" encoding="utf-8"?>
+<file path=customXml/itemProps1.xml><?xml version="1.0" encoding="utf-8"?>
 <ds:datastoreItem xmlns:ds="http://schemas.openxmlformats.org/officeDocument/2006/customXml" ds:itemID="{2D276E62-80A3-44DD-9BCC-97ED2B99B57F}">
   <ds:schemaRefs>
     <ds:schemaRef ds:uri="http://schemas.microsoft.com/office/2006/metadata/contentType"/>
@@ -24596,4 +24649,29 @@
     <ds:schemaRef ds:uri="http://schemas.microsoft.com/internal/obd"/>
   </ds:schemaRefs>
 </ds:datastoreItem>
+</file>
+
+<file path=customXml/itemProps2.xml><?xml version="1.0" encoding="utf-8"?>
+<ds:datastoreItem xmlns:ds="http://schemas.openxmlformats.org/officeDocument/2006/customXml" ds:itemID="{CDB58277-F8DF-46FF-84EC-EF41B835E69F}">
+  <ds:schemaRefs>
+    <ds:schemaRef ds:uri="http://schemas.microsoft.com/sharepoint/v3/contenttype/forms"/>
+  </ds:schemaRefs>
+</ds:datastoreItem>
+</file>
+
+<file path=customXml/itemProps3.xml><?xml version="1.0" encoding="utf-8"?>
+<ds:datastoreItem xmlns:ds="http://schemas.openxmlformats.org/officeDocument/2006/customXml" ds:itemID="{137651BA-F45C-4845-9AB3-E0A65B39F5E1}">
+  <ds:schemaRefs>
+    <ds:schemaRef ds:uri="http://schemas.microsoft.com/office/2006/documentManagement/types"/>
+    <ds:schemaRef ds:uri="http://schemas.microsoft.com/office/infopath/2007/PartnerControls"/>
+    <ds:schemaRef ds:uri="http://purl.org/dc/elements/1.1/"/>
+    <ds:schemaRef ds:uri="71af3243-3dd4-4a8d-8c0d-dd76da1f02a5"/>
+    <ds:schemaRef ds:uri="http://schemas.microsoft.com/office/2006/metadata/properties"/>
+    <ds:schemaRef ds:uri="16c05727-aa75-4e4a-9b5f-8a80a1165891"/>
+    <ds:schemaRef ds:uri="http://purl.org/dc/terms/"/>
+    <ds:schemaRef ds:uri="http://schemas.openxmlformats.org/package/2006/metadata/core-properties"/>
+    <ds:schemaRef ds:uri="http://www.w3.org/XML/1998/namespace"/>
+    <ds:schemaRef ds:uri="http://purl.org/dc/dcmitype/"/>
+  </ds:schemaRefs>
+</ds:datastoreItem>
 </file>
</xml_diff>